<commit_message>
Q20 Updates and tweaks to others
</commit_message>
<xml_diff>
--- a/Vendor_Boards/Great_Cow_Basic_Demo_Board/18Fx6q20_ChipRange_Demonstrations/tutorials/GCBASIC_Part10.pptx
+++ b/Vendor_Boards/Great_Cow_Basic_Demo_Board/18Fx6q20_ChipRange_Demonstrations/tutorials/GCBASIC_Part10.pptx
@@ -211,7 +211,7 @@
             <a:fld id="{742E545A-AB39-44F0-B5A6-04A90C6C9399}" type="datetimeFigureOut">
               <a:rPr lang="en-GB" smtClean="0"/>
               <a:pPr/>
-              <a:t>13/02/2024</a:t>
+              <a:t>28/10/2024</a:t>
             </a:fld>
             <a:endParaRPr lang="en-GB"/>
           </a:p>
@@ -378,7 +378,7 @@
             <a:fld id="{FF100B3C-2E11-428B-8555-A77018253716}" type="datetimeFigureOut">
               <a:rPr lang="en-GB" smtClean="0"/>
               <a:pPr/>
-              <a:t>13/02/2024</a:t>
+              <a:t>28/10/2024</a:t>
             </a:fld>
             <a:endParaRPr lang="en-GB"/>
           </a:p>
@@ -831,7 +831,7 @@
             <a:fld id="{C473AACB-D821-4991-9D88-46EB8D29E619}" type="datetimeFigureOut">
               <a:rPr lang="en-GB" smtClean="0"/>
               <a:pPr/>
-              <a:t>13/02/2024</a:t>
+              <a:t>28/10/2024</a:t>
             </a:fld>
             <a:endParaRPr lang="en-GB" dirty="0"/>
           </a:p>
@@ -999,7 +999,7 @@
             <a:fld id="{C473AACB-D821-4991-9D88-46EB8D29E619}" type="datetimeFigureOut">
               <a:rPr lang="en-GB" smtClean="0"/>
               <a:pPr/>
-              <a:t>13/02/2024</a:t>
+              <a:t>28/10/2024</a:t>
             </a:fld>
             <a:endParaRPr lang="en-GB" dirty="0"/>
           </a:p>
@@ -1177,7 +1177,7 @@
             <a:fld id="{C473AACB-D821-4991-9D88-46EB8D29E619}" type="datetimeFigureOut">
               <a:rPr lang="en-GB" smtClean="0"/>
               <a:pPr/>
-              <a:t>13/02/2024</a:t>
+              <a:t>28/10/2024</a:t>
             </a:fld>
             <a:endParaRPr lang="en-GB" dirty="0"/>
           </a:p>
@@ -1345,7 +1345,7 @@
             <a:fld id="{C473AACB-D821-4991-9D88-46EB8D29E619}" type="datetimeFigureOut">
               <a:rPr lang="en-GB" smtClean="0"/>
               <a:pPr/>
-              <a:t>13/02/2024</a:t>
+              <a:t>28/10/2024</a:t>
             </a:fld>
             <a:endParaRPr lang="en-GB" dirty="0"/>
           </a:p>
@@ -1589,7 +1589,7 @@
             <a:fld id="{C473AACB-D821-4991-9D88-46EB8D29E619}" type="datetimeFigureOut">
               <a:rPr lang="en-GB" smtClean="0"/>
               <a:pPr/>
-              <a:t>13/02/2024</a:t>
+              <a:t>28/10/2024</a:t>
             </a:fld>
             <a:endParaRPr lang="en-GB" dirty="0"/>
           </a:p>
@@ -1875,7 +1875,7 @@
             <a:fld id="{C473AACB-D821-4991-9D88-46EB8D29E619}" type="datetimeFigureOut">
               <a:rPr lang="en-GB" smtClean="0"/>
               <a:pPr/>
-              <a:t>13/02/2024</a:t>
+              <a:t>28/10/2024</a:t>
             </a:fld>
             <a:endParaRPr lang="en-GB" dirty="0"/>
           </a:p>
@@ -2300,7 +2300,7 @@
             <a:fld id="{C473AACB-D821-4991-9D88-46EB8D29E619}" type="datetimeFigureOut">
               <a:rPr lang="en-GB" smtClean="0"/>
               <a:pPr/>
-              <a:t>13/02/2024</a:t>
+              <a:t>28/10/2024</a:t>
             </a:fld>
             <a:endParaRPr lang="en-GB" dirty="0"/>
           </a:p>
@@ -2416,7 +2416,7 @@
             <a:fld id="{C473AACB-D821-4991-9D88-46EB8D29E619}" type="datetimeFigureOut">
               <a:rPr lang="en-GB" smtClean="0"/>
               <a:pPr/>
-              <a:t>13/02/2024</a:t>
+              <a:t>28/10/2024</a:t>
             </a:fld>
             <a:endParaRPr lang="en-GB" dirty="0"/>
           </a:p>
@@ -2509,7 +2509,7 @@
             <a:fld id="{C473AACB-D821-4991-9D88-46EB8D29E619}" type="datetimeFigureOut">
               <a:rPr lang="en-GB" smtClean="0"/>
               <a:pPr/>
-              <a:t>13/02/2024</a:t>
+              <a:t>28/10/2024</a:t>
             </a:fld>
             <a:endParaRPr lang="en-GB" dirty="0"/>
           </a:p>
@@ -2784,7 +2784,7 @@
             <a:fld id="{C473AACB-D821-4991-9D88-46EB8D29E619}" type="datetimeFigureOut">
               <a:rPr lang="en-GB" smtClean="0"/>
               <a:pPr/>
-              <a:t>13/02/2024</a:t>
+              <a:t>28/10/2024</a:t>
             </a:fld>
             <a:endParaRPr lang="en-GB" dirty="0"/>
           </a:p>
@@ -3035,7 +3035,7 @@
             <a:fld id="{C473AACB-D821-4991-9D88-46EB8D29E619}" type="datetimeFigureOut">
               <a:rPr lang="en-GB" smtClean="0"/>
               <a:pPr/>
-              <a:t>13/02/2024</a:t>
+              <a:t>28/10/2024</a:t>
             </a:fld>
             <a:endParaRPr lang="en-GB" dirty="0"/>
           </a:p>
@@ -3246,7 +3246,7 @@
             <a:fld id="{C473AACB-D821-4991-9D88-46EB8D29E619}" type="datetimeFigureOut">
               <a:rPr lang="en-GB" smtClean="0"/>
               <a:pPr/>
-              <a:t>13/02/2024</a:t>
+              <a:t>28/10/2024</a:t>
             </a:fld>
             <a:endParaRPr lang="en-GB" dirty="0"/>
           </a:p>
@@ -3628,7 +3628,12 @@
             <p:ph type="ctrTitle"/>
           </p:nvPr>
         </p:nvSpPr>
-        <p:spPr/>
+        <p:spPr>
+          <a:xfrm>
+            <a:off x="541784" y="1597824"/>
+            <a:ext cx="7772400" cy="1102519"/>
+          </a:xfrm>
+        </p:spPr>
         <p:txBody>
           <a:bodyPr>
             <a:normAutofit fontScale="90000"/>
@@ -3662,7 +3667,7 @@
         </p:nvSpPr>
         <p:spPr>
           <a:xfrm>
-            <a:off x="179513" y="2914650"/>
+            <a:off x="35496" y="2914650"/>
             <a:ext cx="8784976" cy="1925352"/>
           </a:xfrm>
         </p:spPr>
@@ -3690,7 +3695,7 @@
             <a:pPr algn="l"/>
             <a:r>
               <a:rPr lang="en-GB" sz="1700" dirty="0" smtClean="0"/>
-              <a:t>February 2024</a:t>
+              <a:t>October 2024</a:t>
             </a:r>
             <a:endParaRPr lang="en-GB" sz="1700" dirty="0"/>
           </a:p>
@@ -3831,8 +3836,8 @@
         </p:nvSpPr>
         <p:spPr>
           <a:xfrm>
-            <a:off x="1619672" y="3304024"/>
-            <a:ext cx="5535361" cy="707886"/>
+            <a:off x="1144349" y="3304024"/>
+            <a:ext cx="6197980" cy="707886"/>
           </a:xfrm>
           <a:prstGeom prst="rect">
             <a:avLst/>
@@ -3862,7 +3867,25 @@
                   <a:srgbClr val="FF0000"/>
                 </a:solidFill>
               </a:rPr>
-              <a:t>More secrets… Constants</a:t>
+              <a:t>More </a:t>
+            </a:r>
+            <a:r>
+              <a:rPr lang="en-US" sz="4000" b="1" dirty="0" smtClean="0">
+                <a:ln w="10541" cmpd="sng">
+                  <a:solidFill>
+                    <a:srgbClr val="7D7D7D">
+                      <a:tint val="100000"/>
+                      <a:shade val="100000"/>
+                      <a:satMod val="110000"/>
+                    </a:srgbClr>
+                  </a:solidFill>
+                  <a:prstDash val="solid"/>
+                </a:ln>
+                <a:solidFill>
+                  <a:srgbClr val="FF0000"/>
+                </a:solidFill>
+              </a:rPr>
+              <a:t>… EEPROM operations</a:t>
             </a:r>
             <a:endParaRPr lang="en-US" sz="4000" b="1" cap="none" spc="0" dirty="0">
               <a:ln w="10541" cmpd="sng">
@@ -7595,6 +7618,10 @@
             <a:r>
               <a:rPr lang="en-GB" dirty="0" err="1" smtClean="0"/>
               <a:t>EEProm</a:t>
+            </a:r>
+            <a:r>
+              <a:rPr lang="en-GB" dirty="0" smtClean="0"/>
+              <a:t> – 4 ways</a:t>
             </a:r>
             <a:endParaRPr lang="en-GB" dirty="0"/>
           </a:p>

</xml_diff>